<commit_message>
New changes for Rev8, that promote easier clock handling.
</commit_message>
<xml_diff>
--- a/2020_Intern_Poster_Austin_Gnecco.pptx
+++ b/2020_Intern_Poster_Austin_Gnecco.pptx
@@ -273,7 +273,7 @@
             <a:fld id="{9B9E972F-8140-4969-BC57-E2EBEEAC9DC1}" type="datetimeFigureOut">
               <a:rPr lang="en-US" altLang="en-US"/>
               <a:pPr/>
-              <a:t>9/5/2020</a:t>
+              <a:t>9/8/2020</a:t>
             </a:fld>
             <a:endParaRPr lang="en-US" altLang="en-US"/>
           </a:p>
@@ -707,7 +707,7 @@
                 <a:spcPct val="0"/>
               </a:spcBef>
             </a:pPr>
-            <a:endParaRPr lang="en-US" altLang="en-US"/>
+            <a:endParaRPr lang="en-US" altLang="en-US" dirty="0"/>
           </a:p>
         </p:txBody>
       </p:sp>
@@ -4975,7 +4975,7 @@
         <p:spPr bwMode="auto">
           <a:xfrm>
             <a:off x="22828624" y="8763000"/>
-            <a:ext cx="9395012" cy="17373600"/>
+            <a:ext cx="9327776" cy="18214312"/>
           </a:xfrm>
           <a:prstGeom prst="roundRect">
             <a:avLst>
@@ -5137,8 +5137,8 @@
         </p:nvSpPr>
         <p:spPr bwMode="auto">
           <a:xfrm>
-            <a:off x="22860000" y="27355800"/>
-            <a:ext cx="9296400" cy="10058400"/>
+            <a:off x="22828102" y="27762255"/>
+            <a:ext cx="9296400" cy="8715632"/>
           </a:xfrm>
           <a:prstGeom prst="roundRect">
             <a:avLst>
@@ -5300,8 +5300,8 @@
         </p:nvSpPr>
         <p:spPr bwMode="auto">
           <a:xfrm>
-            <a:off x="22824141" y="38328600"/>
-            <a:ext cx="9296400" cy="4419600"/>
+            <a:off x="22824141" y="37109399"/>
+            <a:ext cx="9296400" cy="5638779"/>
           </a:xfrm>
           <a:prstGeom prst="roundRect">
             <a:avLst>
@@ -5510,7 +5510,7 @@
         </p:nvSpPr>
         <p:spPr bwMode="auto">
           <a:xfrm>
-            <a:off x="22860000" y="28346400"/>
+            <a:off x="22828102" y="28752855"/>
             <a:ext cx="9296400" cy="0"/>
           </a:xfrm>
           <a:prstGeom prst="line">
@@ -5557,7 +5557,7 @@
         </p:nvSpPr>
         <p:spPr bwMode="auto">
           <a:xfrm>
-            <a:off x="22824141" y="39319200"/>
+            <a:off x="22824141" y="38100000"/>
             <a:ext cx="9296400" cy="0"/>
           </a:xfrm>
           <a:prstGeom prst="line">
@@ -5750,7 +5750,7 @@
         </p:nvSpPr>
         <p:spPr bwMode="auto">
           <a:xfrm>
-            <a:off x="24993600" y="27432000"/>
+            <a:off x="24961702" y="27838455"/>
             <a:ext cx="5105400" cy="793750"/>
           </a:xfrm>
           <a:prstGeom prst="rect">
@@ -5803,7 +5803,7 @@
         </p:nvSpPr>
         <p:spPr bwMode="auto">
           <a:xfrm>
-            <a:off x="24500541" y="38404800"/>
+            <a:off x="24500541" y="37185600"/>
             <a:ext cx="6324600" cy="793750"/>
           </a:xfrm>
           <a:prstGeom prst="rect">
@@ -6151,7 +6151,7 @@
                 <a:latin typeface="+mn-lt"/>
                 <a:ea typeface="+mn-ea"/>
               </a:rPr>
-              <a:t>Your Affiliation.</a:t>
+              <a:t>LCLS Intern 2020 </a:t>
             </a:r>
           </a:p>
           <a:p>
@@ -6554,7 +6554,7 @@
             <a:pPr algn="just" eaLnBrk="1" hangingPunct="1"/>
             <a:r>
               <a:rPr lang="en-US" altLang="en-US" sz="3200" dirty="0"/>
-              <a:t>	The proposed solution was to design a FPGA based signal splitter, to be used with the encoders on the aiming tables at LCLS. The job of this signal splitter is to take the position information from the encoder and (upon request) deliver that information to either the control motor or a data acquisition device to log its position or report it to the greater control system.</a:t>
+              <a:t>	The proposed solution was to design a FPGA based signal splitter to be used with the encoders on the mirror tables at LCLS. The job of this signal splitter is to take the position information from the encoder and (upon request) deliver that information to either the control motor or a data acquisition device to log its position or report it to the greater control system.</a:t>
             </a:r>
           </a:p>
           <a:p>
@@ -6593,7 +6593,7 @@
         </p:nvSpPr>
         <p:spPr bwMode="auto">
           <a:xfrm>
-            <a:off x="23164800" y="28592463"/>
+            <a:off x="23136447" y="28905255"/>
             <a:ext cx="8763000" cy="7478970"/>
           </a:xfrm>
           <a:prstGeom prst="rect">
@@ -6760,7 +6760,7 @@
             <a:pPr algn="just" eaLnBrk="1" hangingPunct="1"/>
             <a:r>
               <a:rPr lang="en-US" altLang="en-US" sz="3200" dirty="0"/>
-              <a:t>	The ability for LCLS operators to log and verify the positions of mirrors on the beamline should allow for a more complete view of beamline operations.</a:t>
+              <a:t>	The ability for LCLS operators to log and verify the positions of mirrors on the beamline should allow for a more complete view of beamline devices.</a:t>
             </a:r>
           </a:p>
         </p:txBody>
@@ -6781,8 +6781,8 @@
         </p:nvSpPr>
         <p:spPr bwMode="auto">
           <a:xfrm>
-            <a:off x="23128941" y="39471600"/>
-            <a:ext cx="8763000" cy="3046413"/>
+            <a:off x="23128941" y="38252400"/>
+            <a:ext cx="8763000" cy="4524315"/>
           </a:xfrm>
           <a:prstGeom prst="rect">
             <a:avLst/>
@@ -6925,8 +6925,16 @@
           <a:p>
             <a:pPr algn="just" eaLnBrk="1" hangingPunct="1"/>
             <a:r>
-              <a:rPr lang="en-US" altLang="en-US" sz="3200"/>
-              <a:t>Use of the Linac Coherent Light Source (LCLS), SLAC National Accelerator Laboratory, is supported by the U.S. Department of Energy, Office of Science, Office of Basic Energy Sciences under Contract No. DE-AC02-76SF00515.</a:t>
+              <a:rPr lang="en-US" altLang="en-US" sz="3200" dirty="0"/>
+              <a:t>Use of the </a:t>
+            </a:r>
+            <a:r>
+              <a:rPr lang="en-US" altLang="en-US" sz="3200" dirty="0" err="1"/>
+              <a:t>Linac</a:t>
+            </a:r>
+            <a:r>
+              <a:rPr lang="en-US" altLang="en-US" sz="3200" dirty="0"/>
+              <a:t> Coherent Light Source (LCLS), SLAC National Accelerator Laboratory, is supported by the U.S. Department of Energy, Office of Science, Office of Basic Energy Sciences under Contract No. DE-AC02-76SF00515. Additionally, this project would not have been possible without the support of my mentor Tyler Johnson.</a:t>
             </a:r>
           </a:p>
         </p:txBody>
@@ -6947,8 +6955,8 @@
         </p:nvSpPr>
         <p:spPr bwMode="auto">
           <a:xfrm>
-            <a:off x="988359" y="25752355"/>
-            <a:ext cx="8763000" cy="16835378"/>
+            <a:off x="988359" y="25614647"/>
+            <a:ext cx="8763000" cy="17327820"/>
           </a:xfrm>
           <a:prstGeom prst="rect">
             <a:avLst/>
@@ -7107,7 +7115,7 @@
             </a:r>
             <a:r>
               <a:rPr lang="en-US" altLang="en-US" sz="3200" dirty="0"/>
-              <a:t>-C in order to communicate (Fig. 1). In this protocol, an MA signal is sent from the commanding device to act as a clock. It is a square wave that can range anywhere between 1mhz and 10mhz. As not every device is required to use the same frequency, the splitter had to be capable of dealing with multiple clock speeds at the same time.</a:t>
+              <a:t>-C in order to communicate (Fig. 1). In this protocol, a signal is sent on the MA line from the commanding device to act as a clock. It is a square wave that can range anywhere between 1mhz and 10mhz depending on the device. As not every device is required to use the same frequency, the splitter had to be capable of dealing with multiple clock speeds at the same time.</a:t>
             </a:r>
           </a:p>
           <a:p>
@@ -7122,23 +7130,20 @@
             </a:r>
             <a:r>
               <a:rPr lang="en-US" altLang="en-US" sz="3200" dirty="0"/>
-              <a:t>-C Master Module(Fig. 3). This module continuously sends a 10 MHz square wave to the encoder, in order to get new location data as often as possible. As the information is received back from the encoder, this module also counts the number of bits received and looks for errors before passing the information on to the buffer module. </a:t>
+              <a:t>-C Master Module(Fig. 3). This module continuously sends a 10 MHz square wave to the encoder, in order to request new location data as often as possible. As the information is received back from the encoder, this module also counts the number of bits received and looks for errors before passing the information on to the buffer module. </a:t>
             </a:r>
           </a:p>
           <a:p>
             <a:pPr algn="just" eaLnBrk="1" hangingPunct="1"/>
             <a:r>
               <a:rPr lang="en-US" altLang="en-US" sz="3200" dirty="0"/>
-              <a:t>	Upon the encoder signals entering the Buffer Module (Fig. 4), the Task Scheduler (Fig. 5) looks at all of the different signals coming in and decides which requests will be executed first. The DAQ and Motor </a:t>
+              <a:t>	Upon the encoder signals entering the Buffer Module (Fig. 4), the Task Scheduler (Fig. 5) looks at all of the different signals coming into the FPGA and decides which requests will be executed first. The DAQ and Motor </a:t>
             </a:r>
             <a:r>
               <a:rPr lang="en-US" altLang="en-US" sz="3200" dirty="0" err="1"/>
               <a:t>BiSS</a:t>
             </a:r>
-            <a:r>
-              <a:rPr lang="en-US" altLang="en-US" sz="3200" dirty="0"/>
-              <a:t> C Slave modules (shown in Fig. 2) process requests from</a:t>
-            </a:r>
+            <a:endParaRPr lang="en-US" altLang="en-US" sz="3200" dirty="0"/>
           </a:p>
         </p:txBody>
       </p:sp>
@@ -7457,7 +7462,7 @@
             </a:r>
             <a:r>
               <a:rPr lang="en-US" sz="3200" dirty="0"/>
-              <a:t>-C Waveform</a:t>
+              <a:t> C Waveform</a:t>
             </a:r>
           </a:p>
         </p:txBody>
@@ -7673,8 +7678,8 @@
         </p:nvSpPr>
         <p:spPr bwMode="auto">
           <a:xfrm>
-            <a:off x="23164800" y="10019378"/>
-            <a:ext cx="8763000" cy="15358050"/>
+            <a:off x="23090841" y="10019378"/>
+            <a:ext cx="8836959" cy="16835378"/>
           </a:xfrm>
           <a:prstGeom prst="rect">
             <a:avLst/>
@@ -7704,7 +7709,7 @@
           </a:extLst>
         </p:spPr>
         <p:txBody>
-          <a:bodyPr>
+          <a:bodyPr wrap="square">
             <a:spAutoFit/>
           </a:bodyPr>
           <a:lstStyle>
@@ -7818,21 +7823,21 @@
             <a:pPr algn="just" eaLnBrk="1" hangingPunct="1"/>
             <a:r>
               <a:rPr lang="en-US" altLang="en-US" sz="3200" dirty="0"/>
-              <a:t>the DAQ and motor and send signals to the Task Scheduler when they request new encoder location data. </a:t>
+              <a:t>C Slave modules (on the right of Fig. 2) process requests from the DAQ and motor by signaling the Task Scheduler when either requests new encoder location data. </a:t>
             </a:r>
           </a:p>
           <a:p>
             <a:pPr algn="just" eaLnBrk="1" hangingPunct="1"/>
             <a:r>
               <a:rPr lang="en-US" altLang="en-US" sz="3200" dirty="0"/>
-              <a:t>	Read requests from the motor have the highest priority over any action and will be executed first. If there is also a request to write new information from the encoder at the same time as a request to read information, the two events can happen simultaneously. This is because there are two banks of data. When new information from the encoder is received, it is written to bank 1. While new data is being written, the old data can be read off bank 2, to either the motor or the DAQ. Assuming that no errors are detected the banks then switch, making bank 2 the most recent information that is send out of the device, while bank one is written over with new information from the encoder. If an error is detected, the banks do not switch, and the corrupt data is written over by new data, before it becomes the new data to be read.</a:t>
+              <a:t>	To reduce latency, read requests from the motor have the highest priority and will be executed first. If there is also a request to write new information from the encoder at the same time as a request to read information, the two events can happen simultaneously through the dual bank design: When new information from the encoder is received, it is written to bank 1. While new data is being written, the old data can be read off bank 2, to either the motor or the DAQ. Assuming that no errors are detected, the banks switch, making bank 2 the most recent data that is sent out of the device, while bank 1 is written over with new information from the encoder. If an error is detected, the banks do not switch, and the corrupt data is written over by new data before it is read.</a:t>
             </a:r>
           </a:p>
           <a:p>
             <a:pPr algn="just" eaLnBrk="1" hangingPunct="1"/>
             <a:r>
               <a:rPr lang="en-US" altLang="en-US" sz="3200" dirty="0"/>
-              <a:t> 	This structure ensures that the information being sent out can be as recent and accurate as possible, while still allowing for the encoder, motor, and DAQ to all read and write data at their own preferred clock speed. </a:t>
+              <a:t> 	Although this structure is not without its flaws (most noticeably, two reads cannot happen at once and when a write has started, a read must wait until the write finishes to begin) structure helps to minimize latency, while being as accurate as possible and still allowing for the encoder, motor, and DAQ to all read and write data at their native clock speeds. </a:t>
             </a:r>
           </a:p>
         </p:txBody>
@@ -9062,7 +9067,12 @@
 </file>
 
 <file path=customXml/item1.xml><?xml version="1.0" encoding="utf-8"?>
-<LongProperties xmlns="http://schemas.microsoft.com/office/2006/metadata/longProperties"/>
+<?mso-contentType ?>
+<FormTemplates xmlns="http://schemas.microsoft.com/sharepoint/v3/contenttype/forms">
+  <Display>DocumentLibraryForm</Display>
+  <Edit>DocumentLibraryForm</Edit>
+  <New>DocumentLibraryForm</New>
+</FormTemplates>
 </file>
 
 <file path=customXml/item2.xml><?xml version="1.0" encoding="utf-8"?>
@@ -9194,18 +9204,13 @@
 </file>
 
 <file path=customXml/item3.xml><?xml version="1.0" encoding="utf-8"?>
-<?mso-contentType ?>
-<FormTemplates xmlns="http://schemas.microsoft.com/sharepoint/v3/contenttype/forms">
-  <Display>DocumentLibraryForm</Display>
-  <Edit>DocumentLibraryForm</Edit>
-  <New>DocumentLibraryForm</New>
-</FormTemplates>
+<LongProperties xmlns="http://schemas.microsoft.com/office/2006/metadata/longProperties"/>
 </file>
 
 <file path=customXml/itemProps1.xml><?xml version="1.0" encoding="utf-8"?>
-<ds:datastoreItem xmlns:ds="http://schemas.openxmlformats.org/officeDocument/2006/customXml" ds:itemID="{676A83D7-80E1-4C23-BE47-98505306B975}">
+<ds:datastoreItem xmlns:ds="http://schemas.openxmlformats.org/officeDocument/2006/customXml" ds:itemID="{57822185-9FCC-436A-AB3F-AFC75A33855E}">
   <ds:schemaRefs>
-    <ds:schemaRef ds:uri="http://schemas.microsoft.com/office/2006/metadata/longProperties"/>
+    <ds:schemaRef ds:uri="http://schemas.microsoft.com/sharepoint/v3/contenttype/forms"/>
   </ds:schemaRefs>
 </ds:datastoreItem>
 </file>
@@ -9229,9 +9234,9 @@
 </file>
 
 <file path=customXml/itemProps3.xml><?xml version="1.0" encoding="utf-8"?>
-<ds:datastoreItem xmlns:ds="http://schemas.openxmlformats.org/officeDocument/2006/customXml" ds:itemID="{57822185-9FCC-436A-AB3F-AFC75A33855E}">
+<ds:datastoreItem xmlns:ds="http://schemas.openxmlformats.org/officeDocument/2006/customXml" ds:itemID="{676A83D7-80E1-4C23-BE47-98505306B975}">
   <ds:schemaRefs>
-    <ds:schemaRef ds:uri="http://schemas.microsoft.com/sharepoint/v3/contenttype/forms"/>
+    <ds:schemaRef ds:uri="http://schemas.microsoft.com/office/2006/metadata/longProperties"/>
   </ds:schemaRefs>
 </ds:datastoreItem>
 </file>
</xml_diff>